<commit_message>
Add comprehensive PINN evaluation to multi-agent analysis framework
- Run full PINN parameter sweep (160 runs: 8 alpha × 5 dt × 4 variants)
- Update experiment_framework.py to support PINN solvers dynamically
- Enhance multiagent report with detailed PINN analysis section:
  - PINN L2 error table by alpha parameter
  - Solver ranking and practical recommendations
  - PINN-specific key findings
- Update all comparison figures to include PINN variants
- Add 3 new PINN slides to PowerPoint presentation
- Update Key Findings with stability/accuracy/speed comparison

Results summary:
- PINN-FNO: Best neural approach (L2=0.312, 100% stable)
- Traditional methods still more accurate and faster
- All PINN variants maintain unconditional stability

Co-Authored-By: Claude Opus 4.5 <noreply@anthropic.com>
</commit_message>
<xml_diff>
--- a/docs/multiagent_presentation.pptx
+++ b/docs/multiagent_presentation.pptx
@@ -23,6 +23,9 @@
     <p:sldId id="271" r:id="rId22"/>
     <p:sldId id="272" r:id="rId23"/>
     <p:sldId id="273" r:id="rId24"/>
+    <p:sldId id="274" r:id="rId25"/>
+    <p:sldId id="275" r:id="rId26"/>
+    <p:sldId id="276" r:id="rId27"/>
   </p:sldIdLst>
   <p:sldSz cx="9144000" cy="6858000" type="screen4x3"/>
   <p:notesSz cx="6858000" cy="9144000"/>
@@ -3258,7 +3261,7 @@
               </a:defRPr>
             </a:pPr>
             <a:r>
-              <a:t>     Confidence: 100% | Verifications: 5</a:t>
+              <a:t>     Confidence: 100% | Verifications: 14</a:t>
             </a:r>
           </a:p>
         </p:txBody>
@@ -3305,7 +3308,7 @@
               </a:defRPr>
             </a:pPr>
             <a:r>
-              <a:t>     Confidence: 0% | Verifications: 5</a:t>
+              <a:t>     Confidence: 0% | Verifications: 14</a:t>
             </a:r>
           </a:p>
         </p:txBody>
@@ -3352,7 +3355,7 @@
               </a:defRPr>
             </a:pPr>
             <a:r>
-              <a:t>     Confidence: 0% | Verifications: 5</a:t>
+              <a:t>     Confidence: 0% | Verifications: 14</a:t>
             </a:r>
           </a:p>
         </p:txBody>
@@ -3399,7 +3402,7 @@
               </a:defRPr>
             </a:pPr>
             <a:r>
-              <a:t>     Confidence: 0% | Verifications: 5</a:t>
+              <a:t>     Confidence: 0% | Verifications: 14</a:t>
             </a:r>
           </a:p>
         </p:txBody>
@@ -3446,7 +3449,7 @@
               </a:defRPr>
             </a:pPr>
             <a:r>
-              <a:t>     Confidence: 0% | Verifications: 5</a:t>
+              <a:t>     Confidence: 0% | Verifications: 14</a:t>
             </a:r>
           </a:p>
         </p:txBody>
@@ -3493,7 +3496,7 @@
               </a:defRPr>
             </a:pPr>
             <a:r>
-              <a:t>     Confidence: 100% | Verifications: 5</a:t>
+              <a:t>     Confidence: 100% | Verifications: 14</a:t>
             </a:r>
           </a:p>
         </p:txBody>
@@ -5159,29 +5162,40 @@
               <a:defRPr sz="2000"/>
             </a:pPr>
             <a:r>
-              <a:t>• H1 Confirmed: Smaller dt improves spectral stability</a:t>
-            </a:r>
-          </a:p>
-          <a:p>
-            <a:pPr>
-              <a:spcAft>
-                <a:spcPts val="1200"/>
-              </a:spcAft>
-              <a:defRPr sz="2000"/>
-            </a:pPr>
-            <a:r>
-              <a:t>  - dt=0.0001: 100% stable</a:t>
-            </a:r>
-          </a:p>
-          <a:p>
-            <a:pPr>
-              <a:spcAft>
-                <a:spcPts val="1200"/>
-              </a:spcAft>
-              <a:defRPr sz="2000"/>
-            </a:pPr>
-            <a:r>
-              <a:t>  - dt=0.002: 0% stable</a:t>
+              <a:t>• Stability Analysis:</a:t>
+            </a:r>
+          </a:p>
+          <a:p>
+            <a:pPr>
+              <a:spcAft>
+                <a:spcPts val="1200"/>
+              </a:spcAft>
+              <a:defRPr sz="2000"/>
+            </a:pPr>
+            <a:r>
+              <a:t>  • FDM: 100% stable (unconditionally)</a:t>
+            </a:r>
+          </a:p>
+          <a:p>
+            <a:pPr>
+              <a:spcAft>
+                <a:spcPts val="1200"/>
+              </a:spcAft>
+              <a:defRPr sz="2000"/>
+            </a:pPr>
+            <a:r>
+              <a:t>  • PINN: 100% stable (all variants)</a:t>
+            </a:r>
+          </a:p>
+          <a:p>
+            <a:pPr>
+              <a:spcAft>
+                <a:spcPts val="1200"/>
+              </a:spcAft>
+              <a:defRPr sz="2000"/>
+            </a:pPr>
+            <a:r>
+              <a:t>  • Spectral: 74.5% stable (depends on dt, alpha)</a:t>
             </a:r>
           </a:p>
           <a:p>
@@ -5203,18 +5217,51 @@
               <a:defRPr sz="2000"/>
             </a:pPr>
             <a:r>
-              <a:t>• H7 Confirmed: Spectral fails for high alpha</a:t>
-            </a:r>
-          </a:p>
-          <a:p>
-            <a:pPr>
-              <a:spcAft>
-                <a:spcPts val="1200"/>
-              </a:spcAft>
-              <a:defRPr sz="2000"/>
-            </a:pPr>
-            <a:r>
-              <a:t>  - Instability threshold around alpha &gt;= 0.2</a:t>
+              <a:t>• Accuracy Ranking (avg L2 error):</a:t>
+            </a:r>
+          </a:p>
+          <a:p>
+            <a:pPr>
+              <a:spcAft>
+                <a:spcPts val="1200"/>
+              </a:spcAft>
+              <a:defRPr sz="2000"/>
+            </a:pPr>
+            <a:r>
+              <a:t>  1. Spectral: 0.088 (when stable)</a:t>
+            </a:r>
+          </a:p>
+          <a:p>
+            <a:pPr>
+              <a:spcAft>
+                <a:spcPts val="1200"/>
+              </a:spcAft>
+              <a:defRPr sz="2000"/>
+            </a:pPr>
+            <a:r>
+              <a:t>  2. FDM: 0.183</a:t>
+            </a:r>
+          </a:p>
+          <a:p>
+            <a:pPr>
+              <a:spcAft>
+                <a:spcPts val="1200"/>
+              </a:spcAft>
+              <a:defRPr sz="2000"/>
+            </a:pPr>
+            <a:r>
+              <a:t>  3. PINN-FNO: 0.312</a:t>
+            </a:r>
+          </a:p>
+          <a:p>
+            <a:pPr>
+              <a:spcAft>
+                <a:spcPts val="1200"/>
+              </a:spcAft>
+              <a:defRPr sz="2000"/>
+            </a:pPr>
+            <a:r>
+              <a:t>  4. PINN-Improved: 0.640</a:t>
             </a:r>
           </a:p>
           <a:p>
@@ -5236,29 +5283,7 @@
               <a:defRPr sz="2000"/>
             </a:pPr>
             <a:r>
-              <a:t>• FDM Characteristics:</a:t>
-            </a:r>
-          </a:p>
-          <a:p>
-            <a:pPr>
-              <a:spcAft>
-                <a:spcPts val="1200"/>
-              </a:spcAft>
-              <a:defRPr sz="2000"/>
-            </a:pPr>
-            <a:r>
-              <a:t>  - Unconditionally stable (100% for all parameters)</a:t>
-            </a:r>
-          </a:p>
-          <a:p>
-            <a:pPr>
-              <a:spcAft>
-                <a:spcPts val="1200"/>
-              </a:spcAft>
-              <a:defRPr sz="2000"/>
-            </a:pPr>
-            <a:r>
-              <a:t>  - Higher L2 error but more reliable</a:t>
+              <a:t>• Speed: FDM (7ms) ≈ Spectral (10ms) &lt;&lt; PINN (1-20s)</a:t>
             </a:r>
           </a:p>
         </p:txBody>
@@ -5742,7 +5767,7 @@
               <a:defRPr sz="3200" b="1"/>
             </a:pPr>
             <a:r>
-              <a:t>Summary</a:t>
+              <a:t>PINN Solver Analysis</a:t>
             </a:r>
           </a:p>
         </p:txBody>
@@ -5776,51 +5801,7 @@
               <a:defRPr sz="2000"/>
             </a:pPr>
             <a:r>
-              <a:t>• Multi-Agent System provides:</a:t>
-            </a:r>
-          </a:p>
-          <a:p>
-            <a:pPr>
-              <a:spcAft>
-                <a:spcPts val="1200"/>
-              </a:spcAft>
-              <a:defRPr sz="2000"/>
-            </a:pPr>
-            <a:r>
-              <a:t>  - Parallel analysis for faster insights</a:t>
-            </a:r>
-          </a:p>
-          <a:p>
-            <a:pPr>
-              <a:spcAft>
-                <a:spcPts val="1200"/>
-              </a:spcAft>
-              <a:defRPr sz="2000"/>
-            </a:pPr>
-            <a:r>
-              <a:t>  - Specialized agents for different tasks</a:t>
-            </a:r>
-          </a:p>
-          <a:p>
-            <a:pPr>
-              <a:spcAft>
-                <a:spcPts val="1200"/>
-              </a:spcAft>
-              <a:defRPr sz="2000"/>
-            </a:pPr>
-            <a:r>
-              <a:t>  - Hypothesis-driven experimentation</a:t>
-            </a:r>
-          </a:p>
-          <a:p>
-            <a:pPr>
-              <a:spcAft>
-                <a:spcPts val="1200"/>
-              </a:spcAft>
-              <a:defRPr sz="2000"/>
-            </a:pPr>
-            <a:r>
-              <a:t>  - Automated report generation</a:t>
+              <a:t>• Physics-Informed Neural Networks (PINNs) evaluated:</a:t>
             </a:r>
           </a:p>
           <a:p>
@@ -5842,40 +5823,40 @@
               <a:defRPr sz="2000"/>
             </a:pPr>
             <a:r>
-              <a:t>• Results:</a:t>
-            </a:r>
-          </a:p>
-          <a:p>
-            <a:pPr>
-              <a:spcAft>
-                <a:spcPts val="1200"/>
-              </a:spcAft>
-              <a:defRPr sz="2000"/>
-            </a:pPr>
-            <a:r>
-              <a:t>  - 104 experiments analyzed</a:t>
-            </a:r>
-          </a:p>
-          <a:p>
-            <a:pPr>
-              <a:spcAft>
-                <a:spcPts val="1200"/>
-              </a:spcAft>
-              <a:defRPr sz="2000"/>
-            </a:pPr>
-            <a:r>
-              <a:t>  - 6 hypotheses tracked</a:t>
-            </a:r>
-          </a:p>
-          <a:p>
-            <a:pPr>
-              <a:spcAft>
-                <a:spcPts val="1200"/>
-              </a:spcAft>
-              <a:defRPr sz="2000"/>
-            </a:pPr>
-            <a:r>
-              <a:t>  - 2 hypotheses confirmed, 1 rejected</a:t>
+              <a:t>  • PINN Simple: Basic 3-layer MLP (32 hidden units)</a:t>
+            </a:r>
+          </a:p>
+          <a:p>
+            <a:pPr>
+              <a:spcAft>
+                <a:spcPts val="1200"/>
+              </a:spcAft>
+              <a:defRPr sz="2000"/>
+            </a:pPr>
+            <a:r>
+              <a:t>  • PINN Nonlinear: MLP with explicit χ(|T'|) in loss</a:t>
+            </a:r>
+          </a:p>
+          <a:p>
+            <a:pPr>
+              <a:spcAft>
+                <a:spcPts val="1200"/>
+              </a:spcAft>
+              <a:defRPr sz="2000"/>
+            </a:pPr>
+            <a:r>
+              <a:t>  • PINN Improved: Fourier features + residual blocks</a:t>
+            </a:r>
+          </a:p>
+          <a:p>
+            <a:pPr>
+              <a:spcAft>
+                <a:spcPts val="1200"/>
+              </a:spcAft>
+              <a:defRPr sz="2000"/>
+            </a:pPr>
+            <a:r>
+              <a:t>  • PINN FNO: Fourier Neural Operator (spectral learning)</a:t>
             </a:r>
           </a:p>
           <a:p>
@@ -5897,29 +5878,233 @@
               <a:defRPr sz="2000"/>
             </a:pPr>
             <a:r>
-              <a:t>• Future Work:</a:t>
-            </a:r>
-          </a:p>
-          <a:p>
-            <a:pPr>
-              <a:spcAft>
-                <a:spcPts val="1200"/>
-              </a:spcAft>
-              <a:defRPr sz="2000"/>
-            </a:pPr>
-            <a:r>
-              <a:t>  - Add more specialized agents</a:t>
-            </a:r>
-          </a:p>
-          <a:p>
-            <a:pPr>
-              <a:spcAft>
-                <a:spcPts val="1200"/>
-              </a:spcAft>
-              <a:defRPr sz="2000"/>
-            </a:pPr>
-            <a:r>
-              <a:t>  - Implement adaptive experiment selection</a:t>
+              <a:t>• Configuration: 500 epochs, 500 collocation points</a:t>
+            </a:r>
+          </a:p>
+          <a:p>
+            <a:pPr>
+              <a:spcAft>
+                <a:spcPts val="1200"/>
+              </a:spcAft>
+              <a:defRPr sz="2000"/>
+            </a:pPr>
+            <a:r>
+              <a:t>• </a:t>
+            </a:r>
+          </a:p>
+          <a:p>
+            <a:pPr>
+              <a:spcAft>
+                <a:spcPts val="1200"/>
+              </a:spcAft>
+              <a:defRPr sz="2000"/>
+            </a:pPr>
+            <a:r>
+              <a:t>• Total PINN runs: 172</a:t>
+            </a:r>
+          </a:p>
+        </p:txBody>
+      </p:sp>
+    </p:spTree>
+  </p:cSld>
+  <p:clrMapOvr>
+    <a:masterClrMapping/>
+  </p:clrMapOvr>
+</p:sld>
+</file>
+
+<file path=ppt/slides/slide19.xml><?xml version="1.0" encoding="utf-8"?>
+<p:sld xmlns:a="http://schemas.openxmlformats.org/drawingml/2006/main" xmlns:p="http://schemas.openxmlformats.org/presentationml/2006/main" xmlns:r="http://schemas.openxmlformats.org/officeDocument/2006/relationships">
+  <p:cSld>
+    <p:spTree>
+      <p:nvGrpSpPr>
+        <p:cNvPr id="1" name=""/>
+        <p:cNvGrpSpPr/>
+        <p:nvPr/>
+      </p:nvGrpSpPr>
+      <p:grpSpPr/>
+      <p:sp>
+        <p:nvSpPr>
+          <p:cNvPr id="2" name="TextBox 1"/>
+          <p:cNvSpPr txBox="1"/>
+          <p:nvPr/>
+        </p:nvSpPr>
+        <p:spPr>
+          <a:xfrm>
+            <a:off x="457200" y="274320"/>
+            <a:ext cx="8229600" cy="914400"/>
+          </a:xfrm>
+          <a:prstGeom prst="rect">
+            <a:avLst/>
+          </a:prstGeom>
+          <a:noFill/>
+        </p:spPr>
+        <p:txBody>
+          <a:bodyPr wrap="none">
+            <a:spAutoFit/>
+          </a:bodyPr>
+          <a:lstStyle/>
+          <a:p>
+            <a:pPr>
+              <a:defRPr sz="3200" b="1"/>
+            </a:pPr>
+            <a:r>
+              <a:t>PINN Key Findings</a:t>
+            </a:r>
+          </a:p>
+        </p:txBody>
+      </p:sp>
+      <p:sp>
+        <p:nvSpPr>
+          <p:cNvPr id="3" name="TextBox 2"/>
+          <p:cNvSpPr txBox="1"/>
+          <p:nvPr/>
+        </p:nvSpPr>
+        <p:spPr>
+          <a:xfrm>
+            <a:off x="457200" y="1188720"/>
+            <a:ext cx="8229600" cy="5029200"/>
+          </a:xfrm>
+          <a:prstGeom prst="rect">
+            <a:avLst/>
+          </a:prstGeom>
+          <a:noFill/>
+        </p:spPr>
+        <p:txBody>
+          <a:bodyPr wrap="square">
+            <a:spAutoFit/>
+          </a:bodyPr>
+          <a:lstStyle/>
+          <a:p>
+            <a:pPr>
+              <a:spcAft>
+                <a:spcPts val="1200"/>
+              </a:spcAft>
+              <a:defRPr sz="2000"/>
+            </a:pPr>
+            <a:r>
+              <a:t>• 1. Unconditional Stability</a:t>
+            </a:r>
+          </a:p>
+          <a:p>
+            <a:pPr>
+              <a:spcAft>
+                <a:spcPts val="1200"/>
+              </a:spcAft>
+              <a:defRPr sz="2000"/>
+            </a:pPr>
+            <a:r>
+              <a:t>   All PINN variants: 100% stable (like FDM)</a:t>
+            </a:r>
+          </a:p>
+          <a:p>
+            <a:pPr>
+              <a:spcAft>
+                <a:spcPts val="1200"/>
+              </a:spcAft>
+              <a:defRPr sz="2000"/>
+            </a:pPr>
+            <a:r>
+              <a:t>• </a:t>
+            </a:r>
+          </a:p>
+          <a:p>
+            <a:pPr>
+              <a:spcAft>
+                <a:spcPts val="1200"/>
+              </a:spcAft>
+              <a:defRPr sz="2000"/>
+            </a:pPr>
+            <a:r>
+              <a:t>• 2. Accuracy Ranking (L2 error)</a:t>
+            </a:r>
+          </a:p>
+          <a:p>
+            <a:pPr>
+              <a:spcAft>
+                <a:spcPts val="1200"/>
+              </a:spcAft>
+              <a:defRPr sz="2000"/>
+            </a:pPr>
+            <a:r>
+              <a:t>   Spectral (0.088) &gt; FDM (0.183) &gt; FNO (0.312) &gt; Others</a:t>
+            </a:r>
+          </a:p>
+          <a:p>
+            <a:pPr>
+              <a:spcAft>
+                <a:spcPts val="1200"/>
+              </a:spcAft>
+              <a:defRPr sz="2000"/>
+            </a:pPr>
+            <a:r>
+              <a:t>• </a:t>
+            </a:r>
+          </a:p>
+          <a:p>
+            <a:pPr>
+              <a:spcAft>
+                <a:spcPts val="1200"/>
+              </a:spcAft>
+              <a:defRPr sz="2000"/>
+            </a:pPr>
+            <a:r>
+              <a:t>• 3. Computation Time</a:t>
+            </a:r>
+          </a:p>
+          <a:p>
+            <a:pPr>
+              <a:spcAft>
+                <a:spcPts val="1200"/>
+              </a:spcAft>
+              <a:defRPr sz="2000"/>
+            </a:pPr>
+            <a:r>
+              <a:t>   Traditional: ~10ms | PINN: 1-20 seconds</a:t>
+            </a:r>
+          </a:p>
+          <a:p>
+            <a:pPr>
+              <a:spcAft>
+                <a:spcPts val="1200"/>
+              </a:spcAft>
+              <a:defRPr sz="2000"/>
+            </a:pPr>
+            <a:r>
+              <a:t>   → 100-2000x slower than traditional methods</a:t>
+            </a:r>
+          </a:p>
+          <a:p>
+            <a:pPr>
+              <a:spcAft>
+                <a:spcPts val="1200"/>
+              </a:spcAft>
+              <a:defRPr sz="2000"/>
+            </a:pPr>
+            <a:r>
+              <a:t>• </a:t>
+            </a:r>
+          </a:p>
+          <a:p>
+            <a:pPr>
+              <a:spcAft>
+                <a:spcPts val="1200"/>
+              </a:spcAft>
+              <a:defRPr sz="2000"/>
+            </a:pPr>
+            <a:r>
+              <a:t>• 4. Best PINN: FNO</a:t>
+            </a:r>
+          </a:p>
+          <a:p>
+            <a:pPr>
+              <a:spcAft>
+                <a:spcPts val="1200"/>
+              </a:spcAft>
+              <a:defRPr sz="2000"/>
+            </a:pPr>
+            <a:r>
+              <a:t>   ~2x better accuracy than other PINN variants</a:t>
             </a:r>
           </a:p>
         </p:txBody>
@@ -6081,6 +6266,447 @@
 </p:sld>
 </file>
 
+<file path=ppt/slides/slide20.xml><?xml version="1.0" encoding="utf-8"?>
+<p:sld xmlns:a="http://schemas.openxmlformats.org/drawingml/2006/main" xmlns:p="http://schemas.openxmlformats.org/presentationml/2006/main" xmlns:r="http://schemas.openxmlformats.org/officeDocument/2006/relationships">
+  <p:cSld>
+    <p:spTree>
+      <p:nvGrpSpPr>
+        <p:cNvPr id="1" name=""/>
+        <p:cNvGrpSpPr/>
+        <p:nvPr/>
+      </p:nvGrpSpPr>
+      <p:grpSpPr/>
+      <p:sp>
+        <p:nvSpPr>
+          <p:cNvPr id="2" name="TextBox 1"/>
+          <p:cNvSpPr txBox="1"/>
+          <p:nvPr/>
+        </p:nvSpPr>
+        <p:spPr>
+          <a:xfrm>
+            <a:off x="457200" y="274320"/>
+            <a:ext cx="8229600" cy="914400"/>
+          </a:xfrm>
+          <a:prstGeom prst="rect">
+            <a:avLst/>
+          </a:prstGeom>
+          <a:noFill/>
+        </p:spPr>
+        <p:txBody>
+          <a:bodyPr wrap="none">
+            <a:spAutoFit/>
+          </a:bodyPr>
+          <a:lstStyle/>
+          <a:p>
+            <a:pPr>
+              <a:defRPr sz="3200" b="1"/>
+            </a:pPr>
+            <a:r>
+              <a:t>PINN Recommendations</a:t>
+            </a:r>
+          </a:p>
+        </p:txBody>
+      </p:sp>
+      <p:sp>
+        <p:nvSpPr>
+          <p:cNvPr id="3" name="TextBox 2"/>
+          <p:cNvSpPr txBox="1"/>
+          <p:nvPr/>
+        </p:nvSpPr>
+        <p:spPr>
+          <a:xfrm>
+            <a:off x="457200" y="1188720"/>
+            <a:ext cx="8229600" cy="5029200"/>
+          </a:xfrm>
+          <a:prstGeom prst="rect">
+            <a:avLst/>
+          </a:prstGeom>
+          <a:noFill/>
+        </p:spPr>
+        <p:txBody>
+          <a:bodyPr wrap="square">
+            <a:spAutoFit/>
+          </a:bodyPr>
+          <a:lstStyle/>
+          <a:p>
+            <a:pPr>
+              <a:spcAft>
+                <a:spcPts val="1200"/>
+              </a:spcAft>
+              <a:defRPr sz="2000"/>
+            </a:pPr>
+            <a:r>
+              <a:t>• When to use PINN:</a:t>
+            </a:r>
+          </a:p>
+          <a:p>
+            <a:pPr>
+              <a:spcAft>
+                <a:spcPts val="1200"/>
+              </a:spcAft>
+              <a:defRPr sz="2000"/>
+            </a:pPr>
+            <a:r>
+              <a:t>  • Complex/irregular geometries</a:t>
+            </a:r>
+          </a:p>
+          <a:p>
+            <a:pPr>
+              <a:spcAft>
+                <a:spcPts val="1200"/>
+              </a:spcAft>
+              <a:defRPr sz="2000"/>
+            </a:pPr>
+            <a:r>
+              <a:t>  • Inverse problems (parameter estimation)</a:t>
+            </a:r>
+          </a:p>
+          <a:p>
+            <a:pPr>
+              <a:spcAft>
+                <a:spcPts val="1200"/>
+              </a:spcAft>
+              <a:defRPr sz="2000"/>
+            </a:pPr>
+            <a:r>
+              <a:t>  • Sparse or noisy observational data</a:t>
+            </a:r>
+          </a:p>
+          <a:p>
+            <a:pPr>
+              <a:spcAft>
+                <a:spcPts val="1200"/>
+              </a:spcAft>
+              <a:defRPr sz="2000"/>
+            </a:pPr>
+            <a:r>
+              <a:t>  • Need automatic differentiation</a:t>
+            </a:r>
+          </a:p>
+          <a:p>
+            <a:pPr>
+              <a:spcAft>
+                <a:spcPts val="1200"/>
+              </a:spcAft>
+              <a:defRPr sz="2000"/>
+            </a:pPr>
+            <a:r>
+              <a:t>• </a:t>
+            </a:r>
+          </a:p>
+          <a:p>
+            <a:pPr>
+              <a:spcAft>
+                <a:spcPts val="1200"/>
+              </a:spcAft>
+              <a:defRPr sz="2000"/>
+            </a:pPr>
+            <a:r>
+              <a:t>• When NOT to use PINN:</a:t>
+            </a:r>
+          </a:p>
+          <a:p>
+            <a:pPr>
+              <a:spcAft>
+                <a:spcPts val="1200"/>
+              </a:spcAft>
+              <a:defRPr sz="2000"/>
+            </a:pPr>
+            <a:r>
+              <a:t>  • Well-posed forward problems on regular grids</a:t>
+            </a:r>
+          </a:p>
+          <a:p>
+            <a:pPr>
+              <a:spcAft>
+                <a:spcPts val="1200"/>
+              </a:spcAft>
+              <a:defRPr sz="2000"/>
+            </a:pPr>
+            <a:r>
+              <a:t>  • Real-time or performance-critical applications</a:t>
+            </a:r>
+          </a:p>
+          <a:p>
+            <a:pPr>
+              <a:spcAft>
+                <a:spcPts val="1200"/>
+              </a:spcAft>
+              <a:defRPr sz="2000"/>
+            </a:pPr>
+            <a:r>
+              <a:t>  • Simple PDEs with known analytical properties</a:t>
+            </a:r>
+          </a:p>
+          <a:p>
+            <a:pPr>
+              <a:spcAft>
+                <a:spcPts val="1200"/>
+              </a:spcAft>
+              <a:defRPr sz="2000"/>
+            </a:pPr>
+            <a:r>
+              <a:t>• </a:t>
+            </a:r>
+          </a:p>
+          <a:p>
+            <a:pPr>
+              <a:spcAft>
+                <a:spcPts val="1200"/>
+              </a:spcAft>
+              <a:defRPr sz="2000"/>
+            </a:pPr>
+            <a:r>
+              <a:t>• Recommendation: Use FDM/Spectral for this benchmark</a:t>
+            </a:r>
+          </a:p>
+        </p:txBody>
+      </p:sp>
+    </p:spTree>
+  </p:cSld>
+  <p:clrMapOvr>
+    <a:masterClrMapping/>
+  </p:clrMapOvr>
+</p:sld>
+</file>
+
+<file path=ppt/slides/slide21.xml><?xml version="1.0" encoding="utf-8"?>
+<p:sld xmlns:a="http://schemas.openxmlformats.org/drawingml/2006/main" xmlns:p="http://schemas.openxmlformats.org/presentationml/2006/main" xmlns:r="http://schemas.openxmlformats.org/officeDocument/2006/relationships">
+  <p:cSld>
+    <p:spTree>
+      <p:nvGrpSpPr>
+        <p:cNvPr id="1" name=""/>
+        <p:cNvGrpSpPr/>
+        <p:nvPr/>
+      </p:nvGrpSpPr>
+      <p:grpSpPr/>
+      <p:sp>
+        <p:nvSpPr>
+          <p:cNvPr id="2" name="TextBox 1"/>
+          <p:cNvSpPr txBox="1"/>
+          <p:nvPr/>
+        </p:nvSpPr>
+        <p:spPr>
+          <a:xfrm>
+            <a:off x="457200" y="274320"/>
+            <a:ext cx="8229600" cy="914400"/>
+          </a:xfrm>
+          <a:prstGeom prst="rect">
+            <a:avLst/>
+          </a:prstGeom>
+          <a:noFill/>
+        </p:spPr>
+        <p:txBody>
+          <a:bodyPr wrap="none">
+            <a:spAutoFit/>
+          </a:bodyPr>
+          <a:lstStyle/>
+          <a:p>
+            <a:pPr>
+              <a:defRPr sz="3200" b="1"/>
+            </a:pPr>
+            <a:r>
+              <a:t>Summary</a:t>
+            </a:r>
+          </a:p>
+        </p:txBody>
+      </p:sp>
+      <p:sp>
+        <p:nvSpPr>
+          <p:cNvPr id="3" name="TextBox 2"/>
+          <p:cNvSpPr txBox="1"/>
+          <p:nvPr/>
+        </p:nvSpPr>
+        <p:spPr>
+          <a:xfrm>
+            <a:off x="457200" y="1188720"/>
+            <a:ext cx="8229600" cy="5029200"/>
+          </a:xfrm>
+          <a:prstGeom prst="rect">
+            <a:avLst/>
+          </a:prstGeom>
+          <a:noFill/>
+        </p:spPr>
+        <p:txBody>
+          <a:bodyPr wrap="square">
+            <a:spAutoFit/>
+          </a:bodyPr>
+          <a:lstStyle/>
+          <a:p>
+            <a:pPr>
+              <a:spcAft>
+                <a:spcPts val="1200"/>
+              </a:spcAft>
+              <a:defRPr sz="2000"/>
+            </a:pPr>
+            <a:r>
+              <a:t>• Multi-Agent System provides:</a:t>
+            </a:r>
+          </a:p>
+          <a:p>
+            <a:pPr>
+              <a:spcAft>
+                <a:spcPts val="1200"/>
+              </a:spcAft>
+              <a:defRPr sz="2000"/>
+            </a:pPr>
+            <a:r>
+              <a:t>  - Parallel analysis for faster insights</a:t>
+            </a:r>
+          </a:p>
+          <a:p>
+            <a:pPr>
+              <a:spcAft>
+                <a:spcPts val="1200"/>
+              </a:spcAft>
+              <a:defRPr sz="2000"/>
+            </a:pPr>
+            <a:r>
+              <a:t>  - Specialized agents for different tasks</a:t>
+            </a:r>
+          </a:p>
+          <a:p>
+            <a:pPr>
+              <a:spcAft>
+                <a:spcPts val="1200"/>
+              </a:spcAft>
+              <a:defRPr sz="2000"/>
+            </a:pPr>
+            <a:r>
+              <a:t>  - Hypothesis-driven experimentation</a:t>
+            </a:r>
+          </a:p>
+          <a:p>
+            <a:pPr>
+              <a:spcAft>
+                <a:spcPts val="1200"/>
+              </a:spcAft>
+              <a:defRPr sz="2000"/>
+            </a:pPr>
+            <a:r>
+              <a:t>  - Automated report generation</a:t>
+            </a:r>
+          </a:p>
+          <a:p>
+            <a:pPr>
+              <a:spcAft>
+                <a:spcPts val="1200"/>
+              </a:spcAft>
+              <a:defRPr sz="2000"/>
+            </a:pPr>
+            <a:r>
+              <a:t>• </a:t>
+            </a:r>
+          </a:p>
+          <a:p>
+            <a:pPr>
+              <a:spcAft>
+                <a:spcPts val="1200"/>
+              </a:spcAft>
+              <a:defRPr sz="2000"/>
+            </a:pPr>
+            <a:r>
+              <a:t>• Results:</a:t>
+            </a:r>
+          </a:p>
+          <a:p>
+            <a:pPr>
+              <a:spcAft>
+                <a:spcPts val="1200"/>
+              </a:spcAft>
+              <a:defRPr sz="2000"/>
+            </a:pPr>
+            <a:r>
+              <a:t>  - 282 experiments analyzed</a:t>
+            </a:r>
+          </a:p>
+          <a:p>
+            <a:pPr>
+              <a:spcAft>
+                <a:spcPts val="1200"/>
+              </a:spcAft>
+              <a:defRPr sz="2000"/>
+            </a:pPr>
+            <a:r>
+              <a:t>  - 6 solvers compared (incl. PINN)</a:t>
+            </a:r>
+          </a:p>
+          <a:p>
+            <a:pPr>
+              <a:spcAft>
+                <a:spcPts val="1200"/>
+              </a:spcAft>
+              <a:defRPr sz="2000"/>
+            </a:pPr>
+            <a:r>
+              <a:t>  - 6 hypotheses tracked (2 confirmed)</a:t>
+            </a:r>
+          </a:p>
+          <a:p>
+            <a:pPr>
+              <a:spcAft>
+                <a:spcPts val="1200"/>
+              </a:spcAft>
+              <a:defRPr sz="2000"/>
+            </a:pPr>
+            <a:r>
+              <a:t>• </a:t>
+            </a:r>
+          </a:p>
+          <a:p>
+            <a:pPr>
+              <a:spcAft>
+                <a:spcPts val="1200"/>
+              </a:spcAft>
+              <a:defRPr sz="2000"/>
+            </a:pPr>
+            <a:r>
+              <a:t>• Conclusions:</a:t>
+            </a:r>
+          </a:p>
+          <a:p>
+            <a:pPr>
+              <a:spcAft>
+                <a:spcPts val="1200"/>
+              </a:spcAft>
+              <a:defRPr sz="2000"/>
+            </a:pPr>
+            <a:r>
+              <a:t>  - FDM: Best stability-accuracy balance</a:t>
+            </a:r>
+          </a:p>
+          <a:p>
+            <a:pPr>
+              <a:spcAft>
+                <a:spcPts val="1200"/>
+              </a:spcAft>
+              <a:defRPr sz="2000"/>
+            </a:pPr>
+            <a:r>
+              <a:t>  - Spectral: Best accuracy when stable</a:t>
+            </a:r>
+          </a:p>
+          <a:p>
+            <a:pPr>
+              <a:spcAft>
+                <a:spcPts val="1200"/>
+              </a:spcAft>
+              <a:defRPr sz="2000"/>
+            </a:pPr>
+            <a:r>
+              <a:t>  - PINN-FNO: Best neural network approach</a:t>
+            </a:r>
+          </a:p>
+        </p:txBody>
+      </p:sp>
+    </p:spTree>
+  </p:cSld>
+  <p:clrMapOvr>
+    <a:masterClrMapping/>
+  </p:clrMapOvr>
+</p:sld>
+</file>
+
 <file path=ppt/slides/slide3.xml><?xml version="1.0" encoding="utf-8"?>
 <p:sld xmlns:a="http://schemas.openxmlformats.org/drawingml/2006/main" xmlns:p="http://schemas.openxmlformats.org/presentationml/2006/main" xmlns:r="http://schemas.openxmlformats.org/officeDocument/2006/relationships">
   <p:cSld>
@@ -7706,7 +8332,7 @@
               <a:defRPr sz="3200" b="1"/>
             </a:pPr>
             <a:r>
-              <a:t>Experiment Results</a:t>
+              <a:t>Solver Performance Comparison</a:t>
             </a:r>
           </a:p>
         </p:txBody>
@@ -7721,7 +8347,7 @@
         </p:nvGraphicFramePr>
         <p:xfrm>
           <a:off x="457200" y="1371600"/>
-          <a:ext cx="8229600" cy="1371600"/>
+          <a:ext cx="8229600" cy="3200400"/>
         </p:xfrm>
         <a:graphic>
           <a:graphicData uri="http://schemas.openxmlformats.org/drawingml/2006/table">
@@ -7823,7 +8449,7 @@
                         <a:defRPr sz="1200"/>
                       </a:pPr>
                       <a:r>
-                        <a:t>implicit_fdm</a:t>
+                        <a:t>Implicit FDM</a:t>
                       </a:r>
                     </a:p>
                   </a:txBody>
@@ -7838,7 +8464,7 @@
                         <a:defRPr sz="1200"/>
                       </a:pPr>
                       <a:r>
-                        <a:t>52</a:t>
+                        <a:t>55</a:t>
                       </a:r>
                     </a:p>
                   </a:txBody>
@@ -7868,7 +8494,7 @@
                         <a:defRPr sz="1200"/>
                       </a:pPr>
                       <a:r>
-                        <a:t>0.169490</a:t>
+                        <a:t>0.1827</a:t>
                       </a:r>
                     </a:p>
                   </a:txBody>
@@ -7883,7 +8509,7 @@
                         <a:defRPr sz="1200"/>
                       </a:pPr>
                       <a:r>
-                        <a:t>7.14ms</a:t>
+                        <a:t>7.04ms</a:t>
                       </a:r>
                     </a:p>
                   </a:txBody>
@@ -7900,7 +8526,7 @@
                         <a:defRPr sz="1200"/>
                       </a:pPr>
                       <a:r>
-                        <a:t>spectral_cosine</a:t>
+                        <a:t>PINN FNO</a:t>
                       </a:r>
                     </a:p>
                   </a:txBody>
@@ -7915,7 +8541,7 @@
                         <a:defRPr sz="1200"/>
                       </a:pPr>
                       <a:r>
-                        <a:t>52</a:t>
+                        <a:t>43</a:t>
                       </a:r>
                     </a:p>
                   </a:txBody>
@@ -7930,7 +8556,7 @@
                         <a:defRPr sz="1200"/>
                       </a:pPr>
                       <a:r>
-                        <a:t>76.9%</a:t>
+                        <a:t>100.0%</a:t>
                       </a:r>
                     </a:p>
                   </a:txBody>
@@ -7945,7 +8571,7 @@
                         <a:defRPr sz="1200"/>
                       </a:pPr>
                       <a:r>
-                        <a:t>0.088305</a:t>
+                        <a:t>0.3118</a:t>
                       </a:r>
                     </a:p>
                   </a:txBody>
@@ -7960,7 +8586,315 @@
                         <a:defRPr sz="1200"/>
                       </a:pPr>
                       <a:r>
-                        <a:t>9.47ms</a:t>
+                        <a:t>19.50s</a:t>
+                      </a:r>
+                    </a:p>
+                  </a:txBody>
+                  <a:tcPr/>
+                </a:tc>
+              </a:tr>
+              <a:tr h="457200">
+                <a:tc>
+                  <a:txBody>
+                    <a:bodyPr/>
+                    <a:lstStyle/>
+                    <a:p>
+                      <a:pPr algn="ctr">
+                        <a:defRPr sz="1200"/>
+                      </a:pPr>
+                      <a:r>
+                        <a:t>PINN Improved</a:t>
+                      </a:r>
+                    </a:p>
+                  </a:txBody>
+                  <a:tcPr/>
+                </a:tc>
+                <a:tc>
+                  <a:txBody>
+                    <a:bodyPr/>
+                    <a:lstStyle/>
+                    <a:p>
+                      <a:pPr algn="ctr">
+                        <a:defRPr sz="1200"/>
+                      </a:pPr>
+                      <a:r>
+                        <a:t>43</a:t>
+                      </a:r>
+                    </a:p>
+                  </a:txBody>
+                  <a:tcPr/>
+                </a:tc>
+                <a:tc>
+                  <a:txBody>
+                    <a:bodyPr/>
+                    <a:lstStyle/>
+                    <a:p>
+                      <a:pPr algn="ctr">
+                        <a:defRPr sz="1200"/>
+                      </a:pPr>
+                      <a:r>
+                        <a:t>100.0%</a:t>
+                      </a:r>
+                    </a:p>
+                  </a:txBody>
+                  <a:tcPr/>
+                </a:tc>
+                <a:tc>
+                  <a:txBody>
+                    <a:bodyPr/>
+                    <a:lstStyle/>
+                    <a:p>
+                      <a:pPr algn="ctr">
+                        <a:defRPr sz="1200"/>
+                      </a:pPr>
+                      <a:r>
+                        <a:t>0.6397</a:t>
+                      </a:r>
+                    </a:p>
+                  </a:txBody>
+                  <a:tcPr/>
+                </a:tc>
+                <a:tc>
+                  <a:txBody>
+                    <a:bodyPr/>
+                    <a:lstStyle/>
+                    <a:p>
+                      <a:pPr algn="ctr">
+                        <a:defRPr sz="1200"/>
+                      </a:pPr>
+                      <a:r>
+                        <a:t>3.21s</a:t>
+                      </a:r>
+                    </a:p>
+                  </a:txBody>
+                  <a:tcPr/>
+                </a:tc>
+              </a:tr>
+              <a:tr h="457200">
+                <a:tc>
+                  <a:txBody>
+                    <a:bodyPr/>
+                    <a:lstStyle/>
+                    <a:p>
+                      <a:pPr algn="ctr">
+                        <a:defRPr sz="1200"/>
+                      </a:pPr>
+                      <a:r>
+                        <a:t>PINN Nonlinear</a:t>
+                      </a:r>
+                    </a:p>
+                  </a:txBody>
+                  <a:tcPr/>
+                </a:tc>
+                <a:tc>
+                  <a:txBody>
+                    <a:bodyPr/>
+                    <a:lstStyle/>
+                    <a:p>
+                      <a:pPr algn="ctr">
+                        <a:defRPr sz="1200"/>
+                      </a:pPr>
+                      <a:r>
+                        <a:t>43</a:t>
+                      </a:r>
+                    </a:p>
+                  </a:txBody>
+                  <a:tcPr/>
+                </a:tc>
+                <a:tc>
+                  <a:txBody>
+                    <a:bodyPr/>
+                    <a:lstStyle/>
+                    <a:p>
+                      <a:pPr algn="ctr">
+                        <a:defRPr sz="1200"/>
+                      </a:pPr>
+                      <a:r>
+                        <a:t>100.0%</a:t>
+                      </a:r>
+                    </a:p>
+                  </a:txBody>
+                  <a:tcPr/>
+                </a:tc>
+                <a:tc>
+                  <a:txBody>
+                    <a:bodyPr/>
+                    <a:lstStyle/>
+                    <a:p>
+                      <a:pPr algn="ctr">
+                        <a:defRPr sz="1200"/>
+                      </a:pPr>
+                      <a:r>
+                        <a:t>0.6593</a:t>
+                      </a:r>
+                    </a:p>
+                  </a:txBody>
+                  <a:tcPr/>
+                </a:tc>
+                <a:tc>
+                  <a:txBody>
+                    <a:bodyPr/>
+                    <a:lstStyle/>
+                    <a:p>
+                      <a:pPr algn="ctr">
+                        <a:defRPr sz="1200"/>
+                      </a:pPr>
+                      <a:r>
+                        <a:t>0.94s</a:t>
+                      </a:r>
+                    </a:p>
+                  </a:txBody>
+                  <a:tcPr/>
+                </a:tc>
+              </a:tr>
+              <a:tr h="457200">
+                <a:tc>
+                  <a:txBody>
+                    <a:bodyPr/>
+                    <a:lstStyle/>
+                    <a:p>
+                      <a:pPr algn="ctr">
+                        <a:defRPr sz="1200"/>
+                      </a:pPr>
+                      <a:r>
+                        <a:t>PINN Simple</a:t>
+                      </a:r>
+                    </a:p>
+                  </a:txBody>
+                  <a:tcPr/>
+                </a:tc>
+                <a:tc>
+                  <a:txBody>
+                    <a:bodyPr/>
+                    <a:lstStyle/>
+                    <a:p>
+                      <a:pPr algn="ctr">
+                        <a:defRPr sz="1200"/>
+                      </a:pPr>
+                      <a:r>
+                        <a:t>43</a:t>
+                      </a:r>
+                    </a:p>
+                  </a:txBody>
+                  <a:tcPr/>
+                </a:tc>
+                <a:tc>
+                  <a:txBody>
+                    <a:bodyPr/>
+                    <a:lstStyle/>
+                    <a:p>
+                      <a:pPr algn="ctr">
+                        <a:defRPr sz="1200"/>
+                      </a:pPr>
+                      <a:r>
+                        <a:t>100.0%</a:t>
+                      </a:r>
+                    </a:p>
+                  </a:txBody>
+                  <a:tcPr/>
+                </a:tc>
+                <a:tc>
+                  <a:txBody>
+                    <a:bodyPr/>
+                    <a:lstStyle/>
+                    <a:p>
+                      <a:pPr algn="ctr">
+                        <a:defRPr sz="1200"/>
+                      </a:pPr>
+                      <a:r>
+                        <a:t>0.9295</a:t>
+                      </a:r>
+                    </a:p>
+                  </a:txBody>
+                  <a:tcPr/>
+                </a:tc>
+                <a:tc>
+                  <a:txBody>
+                    <a:bodyPr/>
+                    <a:lstStyle/>
+                    <a:p>
+                      <a:pPr algn="ctr">
+                        <a:defRPr sz="1200"/>
+                      </a:pPr>
+                      <a:r>
+                        <a:t>0.94s</a:t>
+                      </a:r>
+                    </a:p>
+                  </a:txBody>
+                  <a:tcPr/>
+                </a:tc>
+              </a:tr>
+              <a:tr h="457200">
+                <a:tc>
+                  <a:txBody>
+                    <a:bodyPr/>
+                    <a:lstStyle/>
+                    <a:p>
+                      <a:pPr algn="ctr">
+                        <a:defRPr sz="1200"/>
+                      </a:pPr>
+                      <a:r>
+                        <a:t>Spectral</a:t>
+                      </a:r>
+                    </a:p>
+                  </a:txBody>
+                  <a:tcPr/>
+                </a:tc>
+                <a:tc>
+                  <a:txBody>
+                    <a:bodyPr/>
+                    <a:lstStyle/>
+                    <a:p>
+                      <a:pPr algn="ctr">
+                        <a:defRPr sz="1200"/>
+                      </a:pPr>
+                      <a:r>
+                        <a:t>55</a:t>
+                      </a:r>
+                    </a:p>
+                  </a:txBody>
+                  <a:tcPr/>
+                </a:tc>
+                <a:tc>
+                  <a:txBody>
+                    <a:bodyPr/>
+                    <a:lstStyle/>
+                    <a:p>
+                      <a:pPr algn="ctr">
+                        <a:defRPr sz="1200"/>
+                      </a:pPr>
+                      <a:r>
+                        <a:t>74.5%</a:t>
+                      </a:r>
+                    </a:p>
+                  </a:txBody>
+                  <a:tcPr/>
+                </a:tc>
+                <a:tc>
+                  <a:txBody>
+                    <a:bodyPr/>
+                    <a:lstStyle/>
+                    <a:p>
+                      <a:pPr algn="ctr">
+                        <a:defRPr sz="1200"/>
+                      </a:pPr>
+                      <a:r>
+                        <a:t>0.0884</a:t>
+                      </a:r>
+                    </a:p>
+                  </a:txBody>
+                  <a:tcPr/>
+                </a:tc>
+                <a:tc>
+                  <a:txBody>
+                    <a:bodyPr/>
+                    <a:lstStyle/>
+                    <a:p>
+                      <a:pPr algn="ctr">
+                        <a:defRPr sz="1200"/>
+                      </a:pPr>
+                      <a:r>
+                        <a:t>9.76ms</a:t>
                       </a:r>
                     </a:p>
                   </a:txBody>

</xml_diff>

<commit_message>
Add P2 FEM, FVM, and Compact4 FDM solvers
New solver implementations:
- P2 FEM: Quadratic finite element method with Galerkin formulation
  - 3-point Gauss quadrature integration
  - Crank-Nicolson time stepping
  - Best accuracy among stable methods (L2=0.097)

- Cell-Centered FVM: Finite volume method
  - Strict conservation of integral quantities
  - Harmonic mean for face diffusivity
  - 100% stable, L2=0.204

- Compact4 FDM: 4th-order compact finite difference
  - Padé-type approximation for high accuracy
  - Tridiagonal stencil
  - L2=0.173, 100% stable

Benchmark results (482 runs, 9 solvers):
- All new methods achieve unconditional stability
- P2 FEM provides best accuracy-stability balance
- Spectral remains most accurate when stable

Updated reports and presentation with new solver comparisons.

Co-Authored-By: Claude Opus 4.5 <noreply@anthropic.com>
</commit_message>
<xml_diff>
--- a/docs/multiagent_presentation.pptx
+++ b/docs/multiagent_presentation.pptx
@@ -26,6 +26,8 @@
     <p:sldId id="274" r:id="rId25"/>
     <p:sldId id="275" r:id="rId26"/>
     <p:sldId id="276" r:id="rId27"/>
+    <p:sldId id="277" r:id="rId28"/>
+    <p:sldId id="278" r:id="rId29"/>
   </p:sldIdLst>
   <p:sldSz cx="9144000" cy="6858000" type="screen4x3"/>
   <p:notesSz cx="6858000" cy="9144000"/>
@@ -5767,7 +5769,7 @@
               <a:defRPr sz="3200" b="1"/>
             </a:pPr>
             <a:r>
-              <a:t>PINN Solver Analysis</a:t>
+              <a:t>New Solver Methods</a:t>
             </a:r>
           </a:p>
         </p:txBody>
@@ -5801,7 +5803,7 @@
               <a:defRPr sz="2000"/>
             </a:pPr>
             <a:r>
-              <a:t>• Physics-Informed Neural Networks (PINNs) evaluated:</a:t>
+              <a:t>• Three new numerical methods implemented:</a:t>
             </a:r>
           </a:p>
           <a:p>
@@ -5823,40 +5825,29 @@
               <a:defRPr sz="2000"/>
             </a:pPr>
             <a:r>
-              <a:t>  • PINN Simple: Basic 3-layer MLP (32 hidden units)</a:t>
-            </a:r>
-          </a:p>
-          <a:p>
-            <a:pPr>
-              <a:spcAft>
-                <a:spcPts val="1200"/>
-              </a:spcAft>
-              <a:defRPr sz="2000"/>
-            </a:pPr>
-            <a:r>
-              <a:t>  • PINN Nonlinear: MLP with explicit χ(|T'|) in loss</a:t>
-            </a:r>
-          </a:p>
-          <a:p>
-            <a:pPr>
-              <a:spcAft>
-                <a:spcPts val="1200"/>
-              </a:spcAft>
-              <a:defRPr sz="2000"/>
-            </a:pPr>
-            <a:r>
-              <a:t>  • PINN Improved: Fourier features + residual blocks</a:t>
-            </a:r>
-          </a:p>
-          <a:p>
-            <a:pPr>
-              <a:spcAft>
-                <a:spcPts val="1200"/>
-              </a:spcAft>
-              <a:defRPr sz="2000"/>
-            </a:pPr>
-            <a:r>
-              <a:t>  • PINN FNO: Fourier Neural Operator (spectral learning)</a:t>
+              <a:t>  • P2 FEM: Quadratic Finite Element Method</a:t>
+            </a:r>
+          </a:p>
+          <a:p>
+            <a:pPr>
+              <a:spcAft>
+                <a:spcPts val="1200"/>
+              </a:spcAft>
+              <a:defRPr sz="2000"/>
+            </a:pPr>
+            <a:r>
+              <a:t>    - Galerkin weak formulation</a:t>
+            </a:r>
+          </a:p>
+          <a:p>
+            <a:pPr>
+              <a:spcAft>
+                <a:spcPts val="1200"/>
+              </a:spcAft>
+              <a:defRPr sz="2000"/>
+            </a:pPr>
+            <a:r>
+              <a:t>    - 3-point Gauss quadrature</a:t>
             </a:r>
           </a:p>
           <a:p>
@@ -5878,7 +5869,29 @@
               <a:defRPr sz="2000"/>
             </a:pPr>
             <a:r>
-              <a:t>• Configuration: 500 epochs, 500 collocation points</a:t>
+              <a:t>  • Cell-Centered FVM: Finite Volume Method</a:t>
+            </a:r>
+          </a:p>
+          <a:p>
+            <a:pPr>
+              <a:spcAft>
+                <a:spcPts val="1200"/>
+              </a:spcAft>
+              <a:defRPr sz="2000"/>
+            </a:pPr>
+            <a:r>
+              <a:t>    - Strict conservation of integral quantities</a:t>
+            </a:r>
+          </a:p>
+          <a:p>
+            <a:pPr>
+              <a:spcAft>
+                <a:spcPts val="1200"/>
+              </a:spcAft>
+              <a:defRPr sz="2000"/>
+            </a:pPr>
+            <a:r>
+              <a:t>    - Harmonic mean for face diffusivity</a:t>
             </a:r>
           </a:p>
           <a:p>
@@ -5900,7 +5913,29 @@
               <a:defRPr sz="2000"/>
             </a:pPr>
             <a:r>
-              <a:t>• Total PINN runs: 172</a:t>
+              <a:t>  • Compact4 FDM: 4th-order Compact FDM</a:t>
+            </a:r>
+          </a:p>
+          <a:p>
+            <a:pPr>
+              <a:spcAft>
+                <a:spcPts val="1200"/>
+              </a:spcAft>
+              <a:defRPr sz="2000"/>
+            </a:pPr>
+            <a:r>
+              <a:t>    - Padé-type approximation for derivatives</a:t>
+            </a:r>
+          </a:p>
+          <a:p>
+            <a:pPr>
+              <a:spcAft>
+                <a:spcPts val="1200"/>
+              </a:spcAft>
+              <a:defRPr sz="2000"/>
+            </a:pPr>
+            <a:r>
+              <a:t>    - Tridiagonal stencil with 4th-order accuracy</a:t>
             </a:r>
           </a:p>
         </p:txBody>
@@ -5949,7 +5984,7 @@
               <a:defRPr sz="3200" b="1"/>
             </a:pPr>
             <a:r>
-              <a:t>PINN Key Findings</a:t>
+              <a:t>New Solvers: Key Results</a:t>
             </a:r>
           </a:p>
         </p:txBody>
@@ -5983,18 +6018,7 @@
               <a:defRPr sz="2000"/>
             </a:pPr>
             <a:r>
-              <a:t>• 1. Unconditional Stability</a:t>
-            </a:r>
-          </a:p>
-          <a:p>
-            <a:pPr>
-              <a:spcAft>
-                <a:spcPts val="1200"/>
-              </a:spcAft>
-              <a:defRPr sz="2000"/>
-            </a:pPr>
-            <a:r>
-              <a:t>   All PINN variants: 100% stable (like FDM)</a:t>
+              <a:t>• Performance (vs 4x-refined reference):</a:t>
             </a:r>
           </a:p>
           <a:p>
@@ -6016,18 +6040,18 @@
               <a:defRPr sz="2000"/>
             </a:pPr>
             <a:r>
-              <a:t>• 2. Accuracy Ranking (L2 error)</a:t>
-            </a:r>
-          </a:p>
-          <a:p>
-            <a:pPr>
-              <a:spcAft>
-                <a:spcPts val="1200"/>
-              </a:spcAft>
-              <a:defRPr sz="2000"/>
-            </a:pPr>
-            <a:r>
-              <a:t>   Spectral (0.088) &gt; FDM (0.183) &gt; FNO (0.312) &gt; Others</a:t>
+              <a:t>  • P2 FEM: L2=0.097, 100% stable, ~1s</a:t>
+            </a:r>
+          </a:p>
+          <a:p>
+            <a:pPr>
+              <a:spcAft>
+                <a:spcPts val="1200"/>
+              </a:spcAft>
+              <a:defRPr sz="2000"/>
+            </a:pPr>
+            <a:r>
+              <a:t>    Best accuracy among stable methods</a:t>
             </a:r>
           </a:p>
           <a:p>
@@ -6049,29 +6073,18 @@
               <a:defRPr sz="2000"/>
             </a:pPr>
             <a:r>
-              <a:t>• 3. Computation Time</a:t>
-            </a:r>
-          </a:p>
-          <a:p>
-            <a:pPr>
-              <a:spcAft>
-                <a:spcPts val="1200"/>
-              </a:spcAft>
-              <a:defRPr sz="2000"/>
-            </a:pPr>
-            <a:r>
-              <a:t>   Traditional: ~10ms | PINN: 1-20 seconds</a:t>
-            </a:r>
-          </a:p>
-          <a:p>
-            <a:pPr>
-              <a:spcAft>
-                <a:spcPts val="1200"/>
-              </a:spcAft>
-              <a:defRPr sz="2000"/>
-            </a:pPr>
-            <a:r>
-              <a:t>   → 100-2000x slower than traditional methods</a:t>
+              <a:t>  • Compact4 FDM: L2=0.173, 100% stable, ~95ms</a:t>
+            </a:r>
+          </a:p>
+          <a:p>
+            <a:pPr>
+              <a:spcAft>
+                <a:spcPts val="1200"/>
+              </a:spcAft>
+              <a:defRPr sz="2000"/>
+            </a:pPr>
+            <a:r>
+              <a:t>    Better than standard FDM</a:t>
             </a:r>
           </a:p>
           <a:p>
@@ -6093,18 +6106,40 @@
               <a:defRPr sz="2000"/>
             </a:pPr>
             <a:r>
-              <a:t>• 4. Best PINN: FNO</a:t>
-            </a:r>
-          </a:p>
-          <a:p>
-            <a:pPr>
-              <a:spcAft>
-                <a:spcPts val="1200"/>
-              </a:spcAft>
-              <a:defRPr sz="2000"/>
-            </a:pPr>
-            <a:r>
-              <a:t>   ~2x better accuracy than other PINN variants</a:t>
+              <a:t>  • Cell-Centered FVM: L2=0.204, 100% stable, ~58ms</a:t>
+            </a:r>
+          </a:p>
+          <a:p>
+            <a:pPr>
+              <a:spcAft>
+                <a:spcPts val="1200"/>
+              </a:spcAft>
+              <a:defRPr sz="2000"/>
+            </a:pPr>
+            <a:r>
+              <a:t>    Similar to implicit FDM</a:t>
+            </a:r>
+          </a:p>
+          <a:p>
+            <a:pPr>
+              <a:spcAft>
+                <a:spcPts val="1200"/>
+              </a:spcAft>
+              <a:defRPr sz="2000"/>
+            </a:pPr>
+            <a:r>
+              <a:t>• </a:t>
+            </a:r>
+          </a:p>
+          <a:p>
+            <a:pPr>
+              <a:spcAft>
+                <a:spcPts val="1200"/>
+              </a:spcAft>
+              <a:defRPr sz="2000"/>
+            </a:pPr>
+            <a:r>
+              <a:t>• All new methods: unconditionally stable</a:t>
             </a:r>
           </a:p>
         </p:txBody>
@@ -6302,7 +6337,7 @@
               <a:defRPr sz="3200" b="1"/>
             </a:pPr>
             <a:r>
-              <a:t>PINN Recommendations</a:t>
+              <a:t>PINN Solver Analysis</a:t>
             </a:r>
           </a:p>
         </p:txBody>
@@ -6336,51 +6371,7 @@
               <a:defRPr sz="2000"/>
             </a:pPr>
             <a:r>
-              <a:t>• When to use PINN:</a:t>
-            </a:r>
-          </a:p>
-          <a:p>
-            <a:pPr>
-              <a:spcAft>
-                <a:spcPts val="1200"/>
-              </a:spcAft>
-              <a:defRPr sz="2000"/>
-            </a:pPr>
-            <a:r>
-              <a:t>  • Complex/irregular geometries</a:t>
-            </a:r>
-          </a:p>
-          <a:p>
-            <a:pPr>
-              <a:spcAft>
-                <a:spcPts val="1200"/>
-              </a:spcAft>
-              <a:defRPr sz="2000"/>
-            </a:pPr>
-            <a:r>
-              <a:t>  • Inverse problems (parameter estimation)</a:t>
-            </a:r>
-          </a:p>
-          <a:p>
-            <a:pPr>
-              <a:spcAft>
-                <a:spcPts val="1200"/>
-              </a:spcAft>
-              <a:defRPr sz="2000"/>
-            </a:pPr>
-            <a:r>
-              <a:t>  • Sparse or noisy observational data</a:t>
-            </a:r>
-          </a:p>
-          <a:p>
-            <a:pPr>
-              <a:spcAft>
-                <a:spcPts val="1200"/>
-              </a:spcAft>
-              <a:defRPr sz="2000"/>
-            </a:pPr>
-            <a:r>
-              <a:t>  • Need automatic differentiation</a:t>
+              <a:t>• Physics-Informed Neural Networks (PINNs) evaluated:</a:t>
             </a:r>
           </a:p>
           <a:p>
@@ -6402,40 +6393,40 @@
               <a:defRPr sz="2000"/>
             </a:pPr>
             <a:r>
-              <a:t>• When NOT to use PINN:</a:t>
-            </a:r>
-          </a:p>
-          <a:p>
-            <a:pPr>
-              <a:spcAft>
-                <a:spcPts val="1200"/>
-              </a:spcAft>
-              <a:defRPr sz="2000"/>
-            </a:pPr>
-            <a:r>
-              <a:t>  • Well-posed forward problems on regular grids</a:t>
-            </a:r>
-          </a:p>
-          <a:p>
-            <a:pPr>
-              <a:spcAft>
-                <a:spcPts val="1200"/>
-              </a:spcAft>
-              <a:defRPr sz="2000"/>
-            </a:pPr>
-            <a:r>
-              <a:t>  • Real-time or performance-critical applications</a:t>
-            </a:r>
-          </a:p>
-          <a:p>
-            <a:pPr>
-              <a:spcAft>
-                <a:spcPts val="1200"/>
-              </a:spcAft>
-              <a:defRPr sz="2000"/>
-            </a:pPr>
-            <a:r>
-              <a:t>  • Simple PDEs with known analytical properties</a:t>
+              <a:t>  • PINN Simple: Basic 3-layer MLP (32 hidden units)</a:t>
+            </a:r>
+          </a:p>
+          <a:p>
+            <a:pPr>
+              <a:spcAft>
+                <a:spcPts val="1200"/>
+              </a:spcAft>
+              <a:defRPr sz="2000"/>
+            </a:pPr>
+            <a:r>
+              <a:t>  • PINN Nonlinear: MLP with explicit χ(|T'|) in loss</a:t>
+            </a:r>
+          </a:p>
+          <a:p>
+            <a:pPr>
+              <a:spcAft>
+                <a:spcPts val="1200"/>
+              </a:spcAft>
+              <a:defRPr sz="2000"/>
+            </a:pPr>
+            <a:r>
+              <a:t>  • PINN Improved: Fourier features + residual blocks</a:t>
+            </a:r>
+          </a:p>
+          <a:p>
+            <a:pPr>
+              <a:spcAft>
+                <a:spcPts val="1200"/>
+              </a:spcAft>
+              <a:defRPr sz="2000"/>
+            </a:pPr>
+            <a:r>
+              <a:t>  • PINN FNO: Fourier Neural Operator (spectral learning)</a:t>
             </a:r>
           </a:p>
           <a:p>
@@ -6457,7 +6448,29 @@
               <a:defRPr sz="2000"/>
             </a:pPr>
             <a:r>
-              <a:t>• Recommendation: Use FDM/Spectral for this benchmark</a:t>
+              <a:t>• Configuration: 500 epochs, 500 collocation points</a:t>
+            </a:r>
+          </a:p>
+          <a:p>
+            <a:pPr>
+              <a:spcAft>
+                <a:spcPts val="1200"/>
+              </a:spcAft>
+              <a:defRPr sz="2000"/>
+            </a:pPr>
+            <a:r>
+              <a:t>• </a:t>
+            </a:r>
+          </a:p>
+          <a:p>
+            <a:pPr>
+              <a:spcAft>
+                <a:spcPts val="1200"/>
+              </a:spcAft>
+              <a:defRPr sz="2000"/>
+            </a:pPr>
+            <a:r>
+              <a:t>• Total PINN runs: 172</a:t>
             </a:r>
           </a:p>
         </p:txBody>
@@ -6506,7 +6519,7 @@
               <a:defRPr sz="3200" b="1"/>
             </a:pPr>
             <a:r>
-              <a:t>Summary</a:t>
+              <a:t>PINN Key Findings</a:t>
             </a:r>
           </a:p>
         </p:txBody>
@@ -6540,51 +6553,18 @@
               <a:defRPr sz="2000"/>
             </a:pPr>
             <a:r>
-              <a:t>• Multi-Agent System provides:</a:t>
-            </a:r>
-          </a:p>
-          <a:p>
-            <a:pPr>
-              <a:spcAft>
-                <a:spcPts val="1200"/>
-              </a:spcAft>
-              <a:defRPr sz="2000"/>
-            </a:pPr>
-            <a:r>
-              <a:t>  - Parallel analysis for faster insights</a:t>
-            </a:r>
-          </a:p>
-          <a:p>
-            <a:pPr>
-              <a:spcAft>
-                <a:spcPts val="1200"/>
-              </a:spcAft>
-              <a:defRPr sz="2000"/>
-            </a:pPr>
-            <a:r>
-              <a:t>  - Specialized agents for different tasks</a:t>
-            </a:r>
-          </a:p>
-          <a:p>
-            <a:pPr>
-              <a:spcAft>
-                <a:spcPts val="1200"/>
-              </a:spcAft>
-              <a:defRPr sz="2000"/>
-            </a:pPr>
-            <a:r>
-              <a:t>  - Hypothesis-driven experimentation</a:t>
-            </a:r>
-          </a:p>
-          <a:p>
-            <a:pPr>
-              <a:spcAft>
-                <a:spcPts val="1200"/>
-              </a:spcAft>
-              <a:defRPr sz="2000"/>
-            </a:pPr>
-            <a:r>
-              <a:t>  - Automated report generation</a:t>
+              <a:t>• 1. Unconditional Stability</a:t>
+            </a:r>
+          </a:p>
+          <a:p>
+            <a:pPr>
+              <a:spcAft>
+                <a:spcPts val="1200"/>
+              </a:spcAft>
+              <a:defRPr sz="2000"/>
+            </a:pPr>
+            <a:r>
+              <a:t>   All PINN variants: 100% stable (like FDM)</a:t>
             </a:r>
           </a:p>
           <a:p>
@@ -6606,29 +6586,404 @@
               <a:defRPr sz="2000"/>
             </a:pPr>
             <a:r>
-              <a:t>• Results:</a:t>
-            </a:r>
-          </a:p>
-          <a:p>
-            <a:pPr>
-              <a:spcAft>
-                <a:spcPts val="1200"/>
-              </a:spcAft>
-              <a:defRPr sz="2000"/>
-            </a:pPr>
-            <a:r>
-              <a:t>  - 282 experiments analyzed</a:t>
-            </a:r>
-          </a:p>
-          <a:p>
-            <a:pPr>
-              <a:spcAft>
-                <a:spcPts val="1200"/>
-              </a:spcAft>
-              <a:defRPr sz="2000"/>
-            </a:pPr>
-            <a:r>
-              <a:t>  - 6 solvers compared (incl. PINN)</a:t>
+              <a:t>• 2. Accuracy Ranking (L2 error)</a:t>
+            </a:r>
+          </a:p>
+          <a:p>
+            <a:pPr>
+              <a:spcAft>
+                <a:spcPts val="1200"/>
+              </a:spcAft>
+              <a:defRPr sz="2000"/>
+            </a:pPr>
+            <a:r>
+              <a:t>   Spectral (0.088) &gt; FDM (0.183) &gt; FNO (0.312) &gt; Others</a:t>
+            </a:r>
+          </a:p>
+          <a:p>
+            <a:pPr>
+              <a:spcAft>
+                <a:spcPts val="1200"/>
+              </a:spcAft>
+              <a:defRPr sz="2000"/>
+            </a:pPr>
+            <a:r>
+              <a:t>• </a:t>
+            </a:r>
+          </a:p>
+          <a:p>
+            <a:pPr>
+              <a:spcAft>
+                <a:spcPts val="1200"/>
+              </a:spcAft>
+              <a:defRPr sz="2000"/>
+            </a:pPr>
+            <a:r>
+              <a:t>• 3. Computation Time</a:t>
+            </a:r>
+          </a:p>
+          <a:p>
+            <a:pPr>
+              <a:spcAft>
+                <a:spcPts val="1200"/>
+              </a:spcAft>
+              <a:defRPr sz="2000"/>
+            </a:pPr>
+            <a:r>
+              <a:t>   Traditional: ~10ms | PINN: 1-20 seconds</a:t>
+            </a:r>
+          </a:p>
+          <a:p>
+            <a:pPr>
+              <a:spcAft>
+                <a:spcPts val="1200"/>
+              </a:spcAft>
+              <a:defRPr sz="2000"/>
+            </a:pPr>
+            <a:r>
+              <a:t>   → 100-2000x slower than traditional methods</a:t>
+            </a:r>
+          </a:p>
+          <a:p>
+            <a:pPr>
+              <a:spcAft>
+                <a:spcPts val="1200"/>
+              </a:spcAft>
+              <a:defRPr sz="2000"/>
+            </a:pPr>
+            <a:r>
+              <a:t>• </a:t>
+            </a:r>
+          </a:p>
+          <a:p>
+            <a:pPr>
+              <a:spcAft>
+                <a:spcPts val="1200"/>
+              </a:spcAft>
+              <a:defRPr sz="2000"/>
+            </a:pPr>
+            <a:r>
+              <a:t>• 4. Best PINN: FNO</a:t>
+            </a:r>
+          </a:p>
+          <a:p>
+            <a:pPr>
+              <a:spcAft>
+                <a:spcPts val="1200"/>
+              </a:spcAft>
+              <a:defRPr sz="2000"/>
+            </a:pPr>
+            <a:r>
+              <a:t>   ~2x better accuracy than other PINN variants</a:t>
+            </a:r>
+          </a:p>
+        </p:txBody>
+      </p:sp>
+    </p:spTree>
+  </p:cSld>
+  <p:clrMapOvr>
+    <a:masterClrMapping/>
+  </p:clrMapOvr>
+</p:sld>
+</file>
+
+<file path=ppt/slides/slide22.xml><?xml version="1.0" encoding="utf-8"?>
+<p:sld xmlns:a="http://schemas.openxmlformats.org/drawingml/2006/main" xmlns:p="http://schemas.openxmlformats.org/presentationml/2006/main" xmlns:r="http://schemas.openxmlformats.org/officeDocument/2006/relationships">
+  <p:cSld>
+    <p:spTree>
+      <p:nvGrpSpPr>
+        <p:cNvPr id="1" name=""/>
+        <p:cNvGrpSpPr/>
+        <p:nvPr/>
+      </p:nvGrpSpPr>
+      <p:grpSpPr/>
+      <p:sp>
+        <p:nvSpPr>
+          <p:cNvPr id="2" name="TextBox 1"/>
+          <p:cNvSpPr txBox="1"/>
+          <p:nvPr/>
+        </p:nvSpPr>
+        <p:spPr>
+          <a:xfrm>
+            <a:off x="457200" y="274320"/>
+            <a:ext cx="8229600" cy="914400"/>
+          </a:xfrm>
+          <a:prstGeom prst="rect">
+            <a:avLst/>
+          </a:prstGeom>
+          <a:noFill/>
+        </p:spPr>
+        <p:txBody>
+          <a:bodyPr wrap="none">
+            <a:spAutoFit/>
+          </a:bodyPr>
+          <a:lstStyle/>
+          <a:p>
+            <a:pPr>
+              <a:defRPr sz="3200" b="1"/>
+            </a:pPr>
+            <a:r>
+              <a:t>PINN Recommendations</a:t>
+            </a:r>
+          </a:p>
+        </p:txBody>
+      </p:sp>
+      <p:sp>
+        <p:nvSpPr>
+          <p:cNvPr id="3" name="TextBox 2"/>
+          <p:cNvSpPr txBox="1"/>
+          <p:nvPr/>
+        </p:nvSpPr>
+        <p:spPr>
+          <a:xfrm>
+            <a:off x="457200" y="1188720"/>
+            <a:ext cx="8229600" cy="5029200"/>
+          </a:xfrm>
+          <a:prstGeom prst="rect">
+            <a:avLst/>
+          </a:prstGeom>
+          <a:noFill/>
+        </p:spPr>
+        <p:txBody>
+          <a:bodyPr wrap="square">
+            <a:spAutoFit/>
+          </a:bodyPr>
+          <a:lstStyle/>
+          <a:p>
+            <a:pPr>
+              <a:spcAft>
+                <a:spcPts val="1200"/>
+              </a:spcAft>
+              <a:defRPr sz="2000"/>
+            </a:pPr>
+            <a:r>
+              <a:t>• When to use PINN:</a:t>
+            </a:r>
+          </a:p>
+          <a:p>
+            <a:pPr>
+              <a:spcAft>
+                <a:spcPts val="1200"/>
+              </a:spcAft>
+              <a:defRPr sz="2000"/>
+            </a:pPr>
+            <a:r>
+              <a:t>  • Complex/irregular geometries</a:t>
+            </a:r>
+          </a:p>
+          <a:p>
+            <a:pPr>
+              <a:spcAft>
+                <a:spcPts val="1200"/>
+              </a:spcAft>
+              <a:defRPr sz="2000"/>
+            </a:pPr>
+            <a:r>
+              <a:t>  • Inverse problems (parameter estimation)</a:t>
+            </a:r>
+          </a:p>
+          <a:p>
+            <a:pPr>
+              <a:spcAft>
+                <a:spcPts val="1200"/>
+              </a:spcAft>
+              <a:defRPr sz="2000"/>
+            </a:pPr>
+            <a:r>
+              <a:t>  • Sparse or noisy observational data</a:t>
+            </a:r>
+          </a:p>
+          <a:p>
+            <a:pPr>
+              <a:spcAft>
+                <a:spcPts val="1200"/>
+              </a:spcAft>
+              <a:defRPr sz="2000"/>
+            </a:pPr>
+            <a:r>
+              <a:t>  • Need automatic differentiation</a:t>
+            </a:r>
+          </a:p>
+          <a:p>
+            <a:pPr>
+              <a:spcAft>
+                <a:spcPts val="1200"/>
+              </a:spcAft>
+              <a:defRPr sz="2000"/>
+            </a:pPr>
+            <a:r>
+              <a:t>• </a:t>
+            </a:r>
+          </a:p>
+          <a:p>
+            <a:pPr>
+              <a:spcAft>
+                <a:spcPts val="1200"/>
+              </a:spcAft>
+              <a:defRPr sz="2000"/>
+            </a:pPr>
+            <a:r>
+              <a:t>• When NOT to use PINN:</a:t>
+            </a:r>
+          </a:p>
+          <a:p>
+            <a:pPr>
+              <a:spcAft>
+                <a:spcPts val="1200"/>
+              </a:spcAft>
+              <a:defRPr sz="2000"/>
+            </a:pPr>
+            <a:r>
+              <a:t>  • Well-posed forward problems on regular grids</a:t>
+            </a:r>
+          </a:p>
+          <a:p>
+            <a:pPr>
+              <a:spcAft>
+                <a:spcPts val="1200"/>
+              </a:spcAft>
+              <a:defRPr sz="2000"/>
+            </a:pPr>
+            <a:r>
+              <a:t>  • Real-time or performance-critical applications</a:t>
+            </a:r>
+          </a:p>
+          <a:p>
+            <a:pPr>
+              <a:spcAft>
+                <a:spcPts val="1200"/>
+              </a:spcAft>
+              <a:defRPr sz="2000"/>
+            </a:pPr>
+            <a:r>
+              <a:t>  • Simple PDEs with known analytical properties</a:t>
+            </a:r>
+          </a:p>
+          <a:p>
+            <a:pPr>
+              <a:spcAft>
+                <a:spcPts val="1200"/>
+              </a:spcAft>
+              <a:defRPr sz="2000"/>
+            </a:pPr>
+            <a:r>
+              <a:t>• </a:t>
+            </a:r>
+          </a:p>
+          <a:p>
+            <a:pPr>
+              <a:spcAft>
+                <a:spcPts val="1200"/>
+              </a:spcAft>
+              <a:defRPr sz="2000"/>
+            </a:pPr>
+            <a:r>
+              <a:t>• Recommendation: Use FDM/Spectral for this benchmark</a:t>
+            </a:r>
+          </a:p>
+        </p:txBody>
+      </p:sp>
+    </p:spTree>
+  </p:cSld>
+  <p:clrMapOvr>
+    <a:masterClrMapping/>
+  </p:clrMapOvr>
+</p:sld>
+</file>
+
+<file path=ppt/slides/slide23.xml><?xml version="1.0" encoding="utf-8"?>
+<p:sld xmlns:a="http://schemas.openxmlformats.org/drawingml/2006/main" xmlns:p="http://schemas.openxmlformats.org/presentationml/2006/main" xmlns:r="http://schemas.openxmlformats.org/officeDocument/2006/relationships">
+  <p:cSld>
+    <p:spTree>
+      <p:nvGrpSpPr>
+        <p:cNvPr id="1" name=""/>
+        <p:cNvGrpSpPr/>
+        <p:nvPr/>
+      </p:nvGrpSpPr>
+      <p:grpSpPr/>
+      <p:sp>
+        <p:nvSpPr>
+          <p:cNvPr id="2" name="TextBox 1"/>
+          <p:cNvSpPr txBox="1"/>
+          <p:nvPr/>
+        </p:nvSpPr>
+        <p:spPr>
+          <a:xfrm>
+            <a:off x="457200" y="274320"/>
+            <a:ext cx="8229600" cy="914400"/>
+          </a:xfrm>
+          <a:prstGeom prst="rect">
+            <a:avLst/>
+          </a:prstGeom>
+          <a:noFill/>
+        </p:spPr>
+        <p:txBody>
+          <a:bodyPr wrap="none">
+            <a:spAutoFit/>
+          </a:bodyPr>
+          <a:lstStyle/>
+          <a:p>
+            <a:pPr>
+              <a:defRPr sz="3200" b="1"/>
+            </a:pPr>
+            <a:r>
+              <a:t>Summary</a:t>
+            </a:r>
+          </a:p>
+        </p:txBody>
+      </p:sp>
+      <p:sp>
+        <p:nvSpPr>
+          <p:cNvPr id="3" name="TextBox 2"/>
+          <p:cNvSpPr txBox="1"/>
+          <p:nvPr/>
+        </p:nvSpPr>
+        <p:spPr>
+          <a:xfrm>
+            <a:off x="457200" y="1188720"/>
+            <a:ext cx="8229600" cy="5029200"/>
+          </a:xfrm>
+          <a:prstGeom prst="rect">
+            <a:avLst/>
+          </a:prstGeom>
+          <a:noFill/>
+        </p:spPr>
+        <p:txBody>
+          <a:bodyPr wrap="square">
+            <a:spAutoFit/>
+          </a:bodyPr>
+          <a:lstStyle/>
+          <a:p>
+            <a:pPr>
+              <a:spcAft>
+                <a:spcPts val="1200"/>
+              </a:spcAft>
+              <a:defRPr sz="2000"/>
+            </a:pPr>
+            <a:r>
+              <a:t>• Comprehensive Solver Comparison:</a:t>
+            </a:r>
+          </a:p>
+          <a:p>
+            <a:pPr>
+              <a:spcAft>
+                <a:spcPts val="1200"/>
+              </a:spcAft>
+              <a:defRPr sz="2000"/>
+            </a:pPr>
+            <a:r>
+              <a:t>  - 482 experiments analyzed</a:t>
+            </a:r>
+          </a:p>
+          <a:p>
+            <a:pPr>
+              <a:spcAft>
+                <a:spcPts val="1200"/>
+              </a:spcAft>
+              <a:defRPr sz="2000"/>
+            </a:pPr>
+            <a:r>
+              <a:t>  - 9 solvers compared</a:t>
             </a:r>
           </a:p>
           <a:p>
@@ -6661,40 +7016,84 @@
               <a:defRPr sz="2000"/>
             </a:pPr>
             <a:r>
-              <a:t>• Conclusions:</a:t>
-            </a:r>
-          </a:p>
-          <a:p>
-            <a:pPr>
-              <a:spcAft>
-                <a:spcPts val="1200"/>
-              </a:spcAft>
-              <a:defRPr sz="2000"/>
-            </a:pPr>
-            <a:r>
-              <a:t>  - FDM: Best stability-accuracy balance</a:t>
-            </a:r>
-          </a:p>
-          <a:p>
-            <a:pPr>
-              <a:spcAft>
-                <a:spcPts val="1200"/>
-              </a:spcAft>
-              <a:defRPr sz="2000"/>
-            </a:pPr>
-            <a:r>
-              <a:t>  - Spectral: Best accuracy when stable</a:t>
-            </a:r>
-          </a:p>
-          <a:p>
-            <a:pPr>
-              <a:spcAft>
-                <a:spcPts val="1200"/>
-              </a:spcAft>
-              <a:defRPr sz="2000"/>
-            </a:pPr>
-            <a:r>
-              <a:t>  - PINN-FNO: Best neural network approach</a:t>
+              <a:t>• Accuracy Ranking (when stable):</a:t>
+            </a:r>
+          </a:p>
+          <a:p>
+            <a:pPr>
+              <a:spcAft>
+                <a:spcPts val="1200"/>
+              </a:spcAft>
+              <a:defRPr sz="2000"/>
+            </a:pPr>
+            <a:r>
+              <a:t>  1. Spectral (L2=0.078) - unstable at high α</a:t>
+            </a:r>
+          </a:p>
+          <a:p>
+            <a:pPr>
+              <a:spcAft>
+                <a:spcPts val="1200"/>
+              </a:spcAft>
+              <a:defRPr sz="2000"/>
+            </a:pPr>
+            <a:r>
+              <a:t>  2. P2 FEM (L2=0.097) - 100% stable</a:t>
+            </a:r>
+          </a:p>
+          <a:p>
+            <a:pPr>
+              <a:spcAft>
+                <a:spcPts val="1200"/>
+              </a:spcAft>
+              <a:defRPr sz="2000"/>
+            </a:pPr>
+            <a:r>
+              <a:t>  3. Compact4 FDM (L2=0.173) - 100% stable</a:t>
+            </a:r>
+          </a:p>
+          <a:p>
+            <a:pPr>
+              <a:spcAft>
+                <a:spcPts val="1200"/>
+              </a:spcAft>
+              <a:defRPr sz="2000"/>
+            </a:pPr>
+            <a:r>
+              <a:t>  4. FDM (L2=0.190) - 100% stable</a:t>
+            </a:r>
+          </a:p>
+          <a:p>
+            <a:pPr>
+              <a:spcAft>
+                <a:spcPts val="1200"/>
+              </a:spcAft>
+              <a:defRPr sz="2000"/>
+            </a:pPr>
+            <a:r>
+              <a:t>  5. PINN-FNO (L2=0.312) - 100% stable</a:t>
+            </a:r>
+          </a:p>
+          <a:p>
+            <a:pPr>
+              <a:spcAft>
+                <a:spcPts val="1200"/>
+              </a:spcAft>
+              <a:defRPr sz="2000"/>
+            </a:pPr>
+            <a:r>
+              <a:t>• </a:t>
+            </a:r>
+          </a:p>
+          <a:p>
+            <a:pPr>
+              <a:spcAft>
+                <a:spcPts val="1200"/>
+              </a:spcAft>
+              <a:defRPr sz="2000"/>
+            </a:pPr>
+            <a:r>
+              <a:t>• Recommendation: P2 FEM for accuracy, FDM for speed</a:t>
             </a:r>
           </a:p>
         </p:txBody>
@@ -8347,7 +8746,7 @@
         </p:nvGraphicFramePr>
         <p:xfrm>
           <a:off x="457200" y="1371600"/>
-          <a:ext cx="8229600" cy="3200400"/>
+          <a:ext cx="8229600" cy="4572000"/>
         </p:xfrm>
         <a:graphic>
           <a:graphicData uri="http://schemas.openxmlformats.org/drawingml/2006/table">
@@ -8449,7 +8848,7 @@
                         <a:defRPr sz="1200"/>
                       </a:pPr>
                       <a:r>
-                        <a:t>Implicit FDM</a:t>
+                        <a:t>FVM</a:t>
                       </a:r>
                     </a:p>
                   </a:txBody>
@@ -8464,7 +8863,7 @@
                         <a:defRPr sz="1200"/>
                       </a:pPr>
                       <a:r>
-                        <a:t>55</a:t>
+                        <a:t>40</a:t>
                       </a:r>
                     </a:p>
                   </a:txBody>
@@ -8494,7 +8893,7 @@
                         <a:defRPr sz="1200"/>
                       </a:pPr>
                       <a:r>
-                        <a:t>0.1827</a:t>
+                        <a:t>0.2040</a:t>
                       </a:r>
                     </a:p>
                   </a:txBody>
@@ -8509,7 +8908,238 @@
                         <a:defRPr sz="1200"/>
                       </a:pPr>
                       <a:r>
-                        <a:t>7.04ms</a:t>
+                        <a:t>58.16ms</a:t>
+                      </a:r>
+                    </a:p>
+                  </a:txBody>
+                  <a:tcPr/>
+                </a:tc>
+              </a:tr>
+              <a:tr h="457200">
+                <a:tc>
+                  <a:txBody>
+                    <a:bodyPr/>
+                    <a:lstStyle/>
+                    <a:p>
+                      <a:pPr algn="ctr">
+                        <a:defRPr sz="1200"/>
+                      </a:pPr>
+                      <a:r>
+                        <a:t>Compact4 FDM</a:t>
+                      </a:r>
+                    </a:p>
+                  </a:txBody>
+                  <a:tcPr/>
+                </a:tc>
+                <a:tc>
+                  <a:txBody>
+                    <a:bodyPr/>
+                    <a:lstStyle/>
+                    <a:p>
+                      <a:pPr algn="ctr">
+                        <a:defRPr sz="1200"/>
+                      </a:pPr>
+                      <a:r>
+                        <a:t>40</a:t>
+                      </a:r>
+                    </a:p>
+                  </a:txBody>
+                  <a:tcPr/>
+                </a:tc>
+                <a:tc>
+                  <a:txBody>
+                    <a:bodyPr/>
+                    <a:lstStyle/>
+                    <a:p>
+                      <a:pPr algn="ctr">
+                        <a:defRPr sz="1200"/>
+                      </a:pPr>
+                      <a:r>
+                        <a:t>100.0%</a:t>
+                      </a:r>
+                    </a:p>
+                  </a:txBody>
+                  <a:tcPr/>
+                </a:tc>
+                <a:tc>
+                  <a:txBody>
+                    <a:bodyPr/>
+                    <a:lstStyle/>
+                    <a:p>
+                      <a:pPr algn="ctr">
+                        <a:defRPr sz="1200"/>
+                      </a:pPr>
+                      <a:r>
+                        <a:t>0.1731</a:t>
+                      </a:r>
+                    </a:p>
+                  </a:txBody>
+                  <a:tcPr/>
+                </a:tc>
+                <a:tc>
+                  <a:txBody>
+                    <a:bodyPr/>
+                    <a:lstStyle/>
+                    <a:p>
+                      <a:pPr algn="ctr">
+                        <a:defRPr sz="1200"/>
+                      </a:pPr>
+                      <a:r>
+                        <a:t>95.29ms</a:t>
+                      </a:r>
+                    </a:p>
+                  </a:txBody>
+                  <a:tcPr/>
+                </a:tc>
+              </a:tr>
+              <a:tr h="457200">
+                <a:tc>
+                  <a:txBody>
+                    <a:bodyPr/>
+                    <a:lstStyle/>
+                    <a:p>
+                      <a:pPr algn="ctr">
+                        <a:defRPr sz="1200"/>
+                      </a:pPr>
+                      <a:r>
+                        <a:t>Implicit FDM</a:t>
+                      </a:r>
+                    </a:p>
+                  </a:txBody>
+                  <a:tcPr/>
+                </a:tc>
+                <a:tc>
+                  <a:txBody>
+                    <a:bodyPr/>
+                    <a:lstStyle/>
+                    <a:p>
+                      <a:pPr algn="ctr">
+                        <a:defRPr sz="1200"/>
+                      </a:pPr>
+                      <a:r>
+                        <a:t>95</a:t>
+                      </a:r>
+                    </a:p>
+                  </a:txBody>
+                  <a:tcPr/>
+                </a:tc>
+                <a:tc>
+                  <a:txBody>
+                    <a:bodyPr/>
+                    <a:lstStyle/>
+                    <a:p>
+                      <a:pPr algn="ctr">
+                        <a:defRPr sz="1200"/>
+                      </a:pPr>
+                      <a:r>
+                        <a:t>100.0%</a:t>
+                      </a:r>
+                    </a:p>
+                  </a:txBody>
+                  <a:tcPr/>
+                </a:tc>
+                <a:tc>
+                  <a:txBody>
+                    <a:bodyPr/>
+                    <a:lstStyle/>
+                    <a:p>
+                      <a:pPr algn="ctr">
+                        <a:defRPr sz="1200"/>
+                      </a:pPr>
+                      <a:r>
+                        <a:t>0.1859</a:t>
+                      </a:r>
+                    </a:p>
+                  </a:txBody>
+                  <a:tcPr/>
+                </a:tc>
+                <a:tc>
+                  <a:txBody>
+                    <a:bodyPr/>
+                    <a:lstStyle/>
+                    <a:p>
+                      <a:pPr algn="ctr">
+                        <a:defRPr sz="1200"/>
+                      </a:pPr>
+                      <a:r>
+                        <a:t>7.53ms</a:t>
+                      </a:r>
+                    </a:p>
+                  </a:txBody>
+                  <a:tcPr/>
+                </a:tc>
+              </a:tr>
+              <a:tr h="457200">
+                <a:tc>
+                  <a:txBody>
+                    <a:bodyPr/>
+                    <a:lstStyle/>
+                    <a:p>
+                      <a:pPr algn="ctr">
+                        <a:defRPr sz="1200"/>
+                      </a:pPr>
+                      <a:r>
+                        <a:t>P2 FEM</a:t>
+                      </a:r>
+                    </a:p>
+                  </a:txBody>
+                  <a:tcPr/>
+                </a:tc>
+                <a:tc>
+                  <a:txBody>
+                    <a:bodyPr/>
+                    <a:lstStyle/>
+                    <a:p>
+                      <a:pPr algn="ctr">
+                        <a:defRPr sz="1200"/>
+                      </a:pPr>
+                      <a:r>
+                        <a:t>40</a:t>
+                      </a:r>
+                    </a:p>
+                  </a:txBody>
+                  <a:tcPr/>
+                </a:tc>
+                <a:tc>
+                  <a:txBody>
+                    <a:bodyPr/>
+                    <a:lstStyle/>
+                    <a:p>
+                      <a:pPr algn="ctr">
+                        <a:defRPr sz="1200"/>
+                      </a:pPr>
+                      <a:r>
+                        <a:t>100.0%</a:t>
+                      </a:r>
+                    </a:p>
+                  </a:txBody>
+                  <a:tcPr/>
+                </a:tc>
+                <a:tc>
+                  <a:txBody>
+                    <a:bodyPr/>
+                    <a:lstStyle/>
+                    <a:p>
+                      <a:pPr algn="ctr">
+                        <a:defRPr sz="1200"/>
+                      </a:pPr>
+                      <a:r>
+                        <a:t>0.0972</a:t>
+                      </a:r>
+                    </a:p>
+                  </a:txBody>
+                  <a:tcPr/>
+                </a:tc>
+                <a:tc>
+                  <a:txBody>
+                    <a:bodyPr/>
+                    <a:lstStyle/>
+                    <a:p>
+                      <a:pPr algn="ctr">
+                        <a:defRPr sz="1200"/>
+                      </a:pPr>
+                      <a:r>
+                        <a:t>1031.90ms</a:t>
                       </a:r>
                     </a:p>
                   </a:txBody>
@@ -8849,7 +9479,7 @@
                         <a:defRPr sz="1200"/>
                       </a:pPr>
                       <a:r>
-                        <a:t>55</a:t>
+                        <a:t>95</a:t>
                       </a:r>
                     </a:p>
                   </a:txBody>
@@ -8864,7 +9494,7 @@
                         <a:defRPr sz="1200"/>
                       </a:pPr>
                       <a:r>
-                        <a:t>74.5%</a:t>
+                        <a:t>72.6%</a:t>
                       </a:r>
                     </a:p>
                   </a:txBody>
@@ -8879,7 +9509,7 @@
                         <a:defRPr sz="1200"/>
                       </a:pPr>
                       <a:r>
-                        <a:t>0.0884</a:t>
+                        <a:t>0.0843</a:t>
                       </a:r>
                     </a:p>
                   </a:txBody>
@@ -8894,7 +9524,7 @@
                         <a:defRPr sz="1200"/>
                       </a:pPr>
                       <a:r>
-                        <a:t>9.76ms</a:t>
+                        <a:t>10.61ms</a:t>
                       </a:r>
                     </a:p>
                   </a:txBody>

</xml_diff>